<commit_message>
assignment test trial 1
</commit_message>
<xml_diff>
--- a/tmp/2024년도_1차면접전형_자기소개자료_김동주.pptx
+++ b/tmp/2024년도_1차면접전형_자기소개자료_김동주.pptx
@@ -8224,7 +8224,7 @@
               <a:rPr kumimoji="1" lang="en-US" altLang="ko-KR" b="1" dirty="0">
                 <a:latin typeface="+mj-lt"/>
               </a:rPr>
-              <a:t>Research &amp; Skills</a:t>
+              <a:t>Projects &amp; Skills</a:t>
             </a:r>
             <a:endParaRPr kumimoji="1" lang="ko-KR" altLang="en-US" b="1" dirty="0">
               <a:latin typeface="+mj-lt"/>
@@ -8265,7 +8265,7 @@
                 <a:latin typeface="+mj-ea"/>
                 <a:ea typeface="+mj-ea"/>
               </a:rPr>
-              <a:t>AI Based Projects</a:t>
+              <a:t>Industry-Academic Cooperation Projects</a:t>
             </a:r>
           </a:p>
           <a:p>
@@ -8371,6 +8371,22 @@
             </a:endParaRPr>
           </a:p>
           <a:p>
+            <a:pPr lvl="2"/>
+            <a:endParaRPr kumimoji="1" lang="en-US" altLang="ko-KR" sz="1000" dirty="0">
+              <a:latin typeface="+mj-ea"/>
+              <a:ea typeface="+mj-ea"/>
+            </a:endParaRPr>
+          </a:p>
+          <a:p>
+            <a:r>
+              <a:rPr kumimoji="1" lang="en-US" altLang="ko-KR" sz="1600" dirty="0">
+                <a:latin typeface="+mj-ea"/>
+                <a:ea typeface="+mj-ea"/>
+              </a:rPr>
+              <a:t>Projects</a:t>
+            </a:r>
+          </a:p>
+          <a:p>
             <a:pPr lvl="1"/>
             <a:r>
               <a:rPr kumimoji="1" lang="en-US" altLang="ko-KR" dirty="0">
@@ -8416,36 +8432,7 @@
                 <a:latin typeface="+mj-ea"/>
                 <a:ea typeface="+mj-ea"/>
               </a:rPr>
-              <a:t>RAG, PROMPT ENGINEERING, and INSTRUCT TUNING skills used to develop a domain-specific chat-bot module based on LLM</a:t>
-            </a:r>
-          </a:p>
-          <a:p>
-            <a:pPr lvl="2"/>
-            <a:endParaRPr kumimoji="1" lang="en-US" altLang="ko-KR" sz="1000" dirty="0">
-              <a:latin typeface="+mj-ea"/>
-              <a:ea typeface="+mj-ea"/>
-            </a:endParaRPr>
-          </a:p>
-          <a:p>
-            <a:r>
-              <a:rPr kumimoji="1" lang="en-US" altLang="ko-KR" sz="1600" dirty="0">
-                <a:latin typeface="+mj-ea"/>
-                <a:ea typeface="+mj-ea"/>
-              </a:rPr>
-              <a:t>Projects</a:t>
-            </a:r>
-          </a:p>
-          <a:p>
-            <a:pPr lvl="1"/>
-            <a:r>
-              <a:rPr kumimoji="1" lang="ko-KR" altLang="en-US" dirty="0">
-                <a:solidFill>
-                  <a:srgbClr val="314355"/>
-                </a:solidFill>
-                <a:latin typeface="+mj-ea"/>
-                <a:ea typeface="+mj-ea"/>
-              </a:rPr>
-              <a:t>카페 찾는 부엉이</a:t>
+              <a:t>RAG, Prompt Engineering, and Instruct Tuning skills used to develop a domain-specific chat-bot module based on LLM</a:t>
             </a:r>
             <a:endParaRPr kumimoji="1" lang="en-US" altLang="ko-KR" dirty="0">
               <a:solidFill>
@@ -8456,47 +8443,16 @@
             </a:endParaRPr>
           </a:p>
           <a:p>
-            <a:pPr lvl="2"/>
+            <a:pPr lvl="1"/>
             <a:r>
               <a:rPr kumimoji="1" lang="ko-KR" altLang="en-US" dirty="0">
-                <a:latin typeface="+mj-ea"/>
-                <a:ea typeface="+mj-ea"/>
-                <a:cs typeface="Samsung Sharp Sans" panose="02000503000000020004" pitchFamily="2" charset="0"/>
-              </a:rPr>
-              <a:t>시험기간</a:t>
-            </a:r>
-            <a:r>
-              <a:rPr kumimoji="1" lang="en-US" altLang="ko-KR" dirty="0">
-                <a:latin typeface="+mj-ea"/>
-                <a:ea typeface="+mj-ea"/>
-                <a:cs typeface="Samsung Sharp Sans" panose="02000503000000020004" pitchFamily="2" charset="0"/>
-              </a:rPr>
-              <a:t>,</a:t>
-            </a:r>
-            <a:r>
-              <a:rPr kumimoji="1" lang="ko-KR" altLang="en-US" dirty="0">
-                <a:latin typeface="+mj-ea"/>
-                <a:ea typeface="+mj-ea"/>
-                <a:cs typeface="Samsung Sharp Sans" panose="02000503000000020004" pitchFamily="2" charset="0"/>
-              </a:rPr>
-              <a:t> 과제기간 자리 없는 도서관에서 지금 열린 카페를 더 쉽게 알 수 있도록 정보 제공 서비스</a:t>
-            </a:r>
-            <a:endParaRPr kumimoji="1" lang="en-US" altLang="ko-KR" dirty="0">
-              <a:latin typeface="+mj-ea"/>
-              <a:ea typeface="+mj-ea"/>
-            </a:endParaRPr>
-          </a:p>
-          <a:p>
-            <a:pPr lvl="1"/>
-            <a:r>
-              <a:rPr kumimoji="1" lang="en-US" altLang="ko-KR" dirty="0" err="1">
                 <a:solidFill>
                   <a:srgbClr val="314355"/>
                 </a:solidFill>
                 <a:latin typeface="+mj-ea"/>
                 <a:ea typeface="+mj-ea"/>
               </a:rPr>
-              <a:t>Re:Road</a:t>
+              <a:t>카페 찾는 부엉이</a:t>
             </a:r>
             <a:endParaRPr kumimoji="1" lang="en-US" altLang="ko-KR" dirty="0">
               <a:solidFill>
@@ -8514,8 +8470,67 @@
                 <a:ea typeface="+mj-ea"/>
                 <a:cs typeface="Samsung Sharp Sans" panose="02000503000000020004" pitchFamily="2" charset="0"/>
               </a:rPr>
+              <a:t>시험기간</a:t>
+            </a:r>
+            <a:r>
+              <a:rPr kumimoji="1" lang="en-US" altLang="ko-KR" dirty="0">
+                <a:latin typeface="+mj-ea"/>
+                <a:ea typeface="+mj-ea"/>
+                <a:cs typeface="Samsung Sharp Sans" panose="02000503000000020004" pitchFamily="2" charset="0"/>
+              </a:rPr>
+              <a:t>,</a:t>
+            </a:r>
+            <a:r>
+              <a:rPr kumimoji="1" lang="ko-KR" altLang="en-US" dirty="0">
+                <a:latin typeface="+mj-ea"/>
+                <a:ea typeface="+mj-ea"/>
+                <a:cs typeface="Samsung Sharp Sans" panose="02000503000000020004" pitchFamily="2" charset="0"/>
+              </a:rPr>
+              <a:t> 자리 없는 도서관에서 지금 열린 카페를 더 쉽게 알 수 있도록 정보 제공 서비스</a:t>
+            </a:r>
+            <a:endParaRPr kumimoji="1" lang="en-US" altLang="ko-KR" dirty="0">
+              <a:latin typeface="+mj-ea"/>
+              <a:ea typeface="+mj-ea"/>
+            </a:endParaRPr>
+          </a:p>
+          <a:p>
+            <a:pPr lvl="1"/>
+            <a:r>
+              <a:rPr kumimoji="1" lang="en-US" altLang="ko-KR" dirty="0" err="1">
+                <a:solidFill>
+                  <a:srgbClr val="314355"/>
+                </a:solidFill>
+                <a:latin typeface="+mj-ea"/>
+                <a:ea typeface="+mj-ea"/>
+              </a:rPr>
+              <a:t>Re:Road</a:t>
+            </a:r>
+            <a:endParaRPr kumimoji="1" lang="en-US" altLang="ko-KR" dirty="0">
+              <a:solidFill>
+                <a:srgbClr val="314355"/>
+              </a:solidFill>
+              <a:latin typeface="+mj-ea"/>
+              <a:ea typeface="+mj-ea"/>
+            </a:endParaRPr>
+          </a:p>
+          <a:p>
+            <a:pPr lvl="2"/>
+            <a:r>
+              <a:rPr kumimoji="1" lang="ko-KR" altLang="en-US" dirty="0">
+                <a:latin typeface="+mj-ea"/>
+                <a:ea typeface="+mj-ea"/>
+                <a:cs typeface="Samsung Sharp Sans" panose="02000503000000020004" pitchFamily="2" charset="0"/>
+              </a:rPr>
               <a:t>지도 기반의 주변 필수 시설 위치 정보 제공 서비스</a:t>
             </a:r>
+            <a:endParaRPr kumimoji="1" lang="en-US" altLang="ko-KR" dirty="0">
+              <a:latin typeface="+mj-ea"/>
+              <a:ea typeface="+mj-ea"/>
+              <a:cs typeface="Samsung Sharp Sans" panose="02000503000000020004" pitchFamily="2" charset="0"/>
+            </a:endParaRPr>
+          </a:p>
+          <a:p>
+            <a:pPr lvl="2"/>
             <a:endParaRPr kumimoji="1" lang="en-US" altLang="ko-KR" dirty="0">
               <a:latin typeface="+mj-ea"/>
               <a:ea typeface="+mj-ea"/>
@@ -8586,7 +8601,7 @@
                 <a:latin typeface="+mj-ea"/>
                 <a:ea typeface="+mj-ea"/>
               </a:rPr>
-              <a:t>Pytorch</a:t>
+              <a:t>PyTorch</a:t>
             </a:r>
             <a:r>
               <a:rPr kumimoji="1" lang="en-US" altLang="ko-KR" dirty="0">
@@ -9649,9 +9664,10 @@
           <a:lstStyle/>
           <a:p>
             <a:r>
-              <a:rPr kumimoji="1" lang="en-US" altLang="ko-KR" sz="1800" dirty="0"/>
-              <a:t>AI Based Projects</a:t>
-            </a:r>
+              <a:rPr kumimoji="1" lang="en-US" altLang="ko-KR" dirty="0"/>
+              <a:t>Poopy</a:t>
+            </a:r>
+            <a:endParaRPr kumimoji="1" lang="en-US" altLang="ko-KR" sz="1800" dirty="0"/>
           </a:p>
         </p:txBody>
       </p:sp>
@@ -9875,14 +9891,14 @@
                 <a:latin typeface="+mn-ea"/>
                 <a:cs typeface="Samsung Sharp Sans" panose="02000503000000020004" pitchFamily="2" charset="0"/>
               </a:rPr>
-              <a:t>,</a:t>
+              <a:t>/</a:t>
             </a:r>
             <a:r>
               <a:rPr kumimoji="1" lang="ko-KR" altLang="en-US" sz="1200" dirty="0">
                 <a:latin typeface="+mn-ea"/>
                 <a:cs typeface="Samsung Sharp Sans" panose="02000503000000020004" pitchFamily="2" charset="0"/>
               </a:rPr>
-              <a:t> 프로젝트 기획 및 언어 모델 개발</a:t>
+              <a:t>프로젝트 기획 및 언어 모델 개발</a:t>
             </a:r>
             <a:r>
               <a:rPr kumimoji="1" lang="en-US" altLang="ko-KR" sz="1200" dirty="0">
@@ -9953,7 +9969,7 @@
         <p:spPr>
           <a:xfrm>
             <a:off x="5147920" y="1714157"/>
-            <a:ext cx="3996080" cy="2973250"/>
+            <a:ext cx="3996080" cy="2717667"/>
           </a:xfrm>
           <a:prstGeom prst="rect">
             <a:avLst/>
@@ -10097,22 +10113,9 @@
               </a:rPr>
               <a:t>건강 도우미</a:t>
             </a:r>
-            <a:br>
-              <a:rPr kumimoji="1" lang="en-US" altLang="ko-KR" sz="1100" b="1" dirty="0">
-                <a:latin typeface="+mn-ea"/>
-                <a:cs typeface="Samsung Sharp Sans" panose="02000503000000020004" pitchFamily="2" charset="0"/>
-              </a:rPr>
-            </a:br>
-            <a:r>
-              <a:rPr kumimoji="1" lang="ko-KR" altLang="en-US" sz="1100" dirty="0">
-                <a:latin typeface="+mn-ea"/>
-                <a:cs typeface="Samsung Sharp Sans" panose="02000503000000020004" pitchFamily="2" charset="0"/>
-              </a:rPr>
-              <a:t>동물병원 방문을 유도하여 반려견의 웰빙에 기여</a:t>
-            </a:r>
-            <a:endParaRPr kumimoji="1" lang="en-US" altLang="ko-KR" sz="1200" b="1" dirty="0">
+            <a:endParaRPr kumimoji="1" lang="en-US" altLang="ko-KR" sz="1100" b="1" dirty="0">
               <a:solidFill>
-                <a:srgbClr val="1428A0"/>
+                <a:srgbClr val="314355"/>
               </a:solidFill>
               <a:latin typeface="+mn-ea"/>
               <a:cs typeface="Samsung Sharp Sans" panose="02000503000000020004" pitchFamily="2" charset="0"/>
@@ -10476,9 +10479,10 @@
           <a:lstStyle/>
           <a:p>
             <a:r>
-              <a:rPr kumimoji="1" lang="en-US" altLang="ko-KR" sz="1800" dirty="0"/>
-              <a:t>None AI Based Projects</a:t>
-            </a:r>
+              <a:rPr kumimoji="1" lang="ko-KR" altLang="en-US" sz="1800" dirty="0"/>
+              <a:t>카페 찾는 부엉이</a:t>
+            </a:r>
+            <a:endParaRPr kumimoji="1" lang="en-US" altLang="ko-KR" sz="1800" dirty="0"/>
           </a:p>
         </p:txBody>
       </p:sp>
@@ -10627,23 +10631,7 @@
                 <a:ea typeface="Pretendard" panose="02000503000000020004" pitchFamily="2" charset="-127"/>
                 <a:cs typeface="Samsung Sharp Sans" panose="02000503000000020004" pitchFamily="2" charset="0"/>
               </a:rPr>
-              <a:t>현</a:t>
-            </a:r>
-            <a:r>
-              <a:rPr kumimoji="1" lang="en-US" altLang="ko-KR" sz="1200" dirty="0">
-                <a:latin typeface="Samsung Sharp Sans" panose="02000503000000020004" pitchFamily="2" charset="0"/>
-                <a:ea typeface="Pretendard" panose="02000503000000020004" pitchFamily="2" charset="-127"/>
-                <a:cs typeface="Samsung Sharp Sans" panose="02000503000000020004" pitchFamily="2" charset="0"/>
-              </a:rPr>
-              <a:t>,</a:t>
-            </a:r>
-            <a:r>
-              <a:rPr kumimoji="1" lang="ko-KR" altLang="en-US" sz="1200" dirty="0">
-                <a:latin typeface="Samsung Sharp Sans" panose="02000503000000020004" pitchFamily="2" charset="0"/>
-                <a:ea typeface="Pretendard" panose="02000503000000020004" pitchFamily="2" charset="-127"/>
-                <a:cs typeface="Samsung Sharp Sans" panose="02000503000000020004" pitchFamily="2" charset="0"/>
-              </a:rPr>
-              <a:t> 지도 서비스의 영업시간 정보 상이함 문제 인식</a:t>
+              <a:t>지도 서비스의 영업시간 정보 상이함 문제 인식</a:t>
             </a:r>
             <a:endParaRPr kumimoji="1" lang="en-US" altLang="ko-KR" sz="1200" dirty="0">
               <a:latin typeface="Samsung Sharp Sans" panose="02000503000000020004" pitchFamily="2" charset="0"/>
@@ -10970,7 +10958,7 @@
                 <a:ea typeface="Samsung Sharp Sans" panose="02000503000000020004" pitchFamily="2" charset="0"/>
                 <a:cs typeface="Samsung Sharp Sans" panose="02000503000000020004" pitchFamily="2" charset="0"/>
               </a:rPr>
-              <a:t>,</a:t>
+              <a:t>/</a:t>
             </a:r>
             <a:r>
               <a:rPr kumimoji="1" lang="ko-KR" altLang="en-US" sz="1200" dirty="0">
@@ -10978,7 +10966,7 @@
                 <a:ea typeface="Pretendard" panose="02000503000000020004" pitchFamily="2" charset="-127"/>
                 <a:cs typeface="Samsung Sharp Sans" panose="02000503000000020004" pitchFamily="2" charset="0"/>
               </a:rPr>
-              <a:t> 프로젝트 기획</a:t>
+              <a:t>프로젝트 기획</a:t>
             </a:r>
             <a:r>
               <a:rPr kumimoji="1" lang="en-US" altLang="ko-KR" sz="1200" dirty="0">
@@ -11053,20 +11041,12 @@
               <a:buChar char="•"/>
             </a:pPr>
             <a:r>
-              <a:rPr kumimoji="1" lang="ko-KR" altLang="en-US" sz="1200" dirty="0">
-                <a:latin typeface="Pretendard" panose="02000503000000020004" pitchFamily="2" charset="-127"/>
-                <a:ea typeface="Pretendard" panose="02000503000000020004" pitchFamily="2" charset="-127"/>
-                <a:cs typeface="Pretendard" panose="02000503000000020004" pitchFamily="2" charset="-127"/>
-              </a:rPr>
-              <a:t>학부생들로 </a:t>
-            </a:r>
-            <a:r>
               <a:rPr kumimoji="1" lang="ko-KR" altLang="en-US" sz="1200" dirty="0" err="1">
                 <a:latin typeface="Pretendard" panose="02000503000000020004" pitchFamily="2" charset="-127"/>
                 <a:ea typeface="Pretendard" panose="02000503000000020004" pitchFamily="2" charset="-127"/>
                 <a:cs typeface="Pretendard" panose="02000503000000020004" pitchFamily="2" charset="-127"/>
               </a:rPr>
-              <a:t>부터</a:t>
+              <a:t>학부생들로부터</a:t>
             </a:r>
             <a:r>
               <a:rPr kumimoji="1" lang="ko-KR" altLang="en-US" sz="1200" dirty="0">
@@ -14028,7 +14008,7 @@
                   </a:solidFill>
                   <a:latin typeface="+mj-lt"/>
                 </a:rPr>
-                <a:t>사용자 중심 서비스 개발 역량 강화</a:t>
+                <a:t>사용자 중심 서비스 역량 강화</a:t>
               </a:r>
             </a:p>
           </p:txBody>

</xml_diff>